<commit_message>
updates the developers' guide (component module diagrams, simplified wording in various places)
</commit_message>
<xml_diff>
--- a/pptx/modules.pptx
+++ b/pptx/modules.pptx
@@ -243,7 +243,7 @@
           <a:p>
             <a:fld id="{4F779DD4-469B-4BEB-B40F-8B2DB02A23A7}" type="datetimeFigureOut">
               <a:rPr lang="en-GB" smtClean="0"/>
-              <a:t>17/10/2016</a:t>
+              <a:t>20/10/2016</a:t>
             </a:fld>
             <a:endParaRPr lang="en-GB"/>
           </a:p>
@@ -413,7 +413,7 @@
           <a:p>
             <a:fld id="{4F779DD4-469B-4BEB-B40F-8B2DB02A23A7}" type="datetimeFigureOut">
               <a:rPr lang="en-GB" smtClean="0"/>
-              <a:t>17/10/2016</a:t>
+              <a:t>20/10/2016</a:t>
             </a:fld>
             <a:endParaRPr lang="en-GB"/>
           </a:p>
@@ -593,7 +593,7 @@
           <a:p>
             <a:fld id="{4F779DD4-469B-4BEB-B40F-8B2DB02A23A7}" type="datetimeFigureOut">
               <a:rPr lang="en-GB" smtClean="0"/>
-              <a:t>17/10/2016</a:t>
+              <a:t>20/10/2016</a:t>
             </a:fld>
             <a:endParaRPr lang="en-GB"/>
           </a:p>
@@ -763,7 +763,7 @@
           <a:p>
             <a:fld id="{4F779DD4-469B-4BEB-B40F-8B2DB02A23A7}" type="datetimeFigureOut">
               <a:rPr lang="en-GB" smtClean="0"/>
-              <a:t>17/10/2016</a:t>
+              <a:t>20/10/2016</a:t>
             </a:fld>
             <a:endParaRPr lang="en-GB"/>
           </a:p>
@@ -1009,7 +1009,7 @@
           <a:p>
             <a:fld id="{4F779DD4-469B-4BEB-B40F-8B2DB02A23A7}" type="datetimeFigureOut">
               <a:rPr lang="en-GB" smtClean="0"/>
-              <a:t>17/10/2016</a:t>
+              <a:t>20/10/2016</a:t>
             </a:fld>
             <a:endParaRPr lang="en-GB"/>
           </a:p>
@@ -1241,7 +1241,7 @@
           <a:p>
             <a:fld id="{4F779DD4-469B-4BEB-B40F-8B2DB02A23A7}" type="datetimeFigureOut">
               <a:rPr lang="en-GB" smtClean="0"/>
-              <a:t>17/10/2016</a:t>
+              <a:t>20/10/2016</a:t>
             </a:fld>
             <a:endParaRPr lang="en-GB"/>
           </a:p>
@@ -1608,7 +1608,7 @@
           <a:p>
             <a:fld id="{4F779DD4-469B-4BEB-B40F-8B2DB02A23A7}" type="datetimeFigureOut">
               <a:rPr lang="en-GB" smtClean="0"/>
-              <a:t>17/10/2016</a:t>
+              <a:t>20/10/2016</a:t>
             </a:fld>
             <a:endParaRPr lang="en-GB"/>
           </a:p>
@@ -1726,7 +1726,7 @@
           <a:p>
             <a:fld id="{4F779DD4-469B-4BEB-B40F-8B2DB02A23A7}" type="datetimeFigureOut">
               <a:rPr lang="en-GB" smtClean="0"/>
-              <a:t>17/10/2016</a:t>
+              <a:t>20/10/2016</a:t>
             </a:fld>
             <a:endParaRPr lang="en-GB"/>
           </a:p>
@@ -1821,7 +1821,7 @@
           <a:p>
             <a:fld id="{4F779DD4-469B-4BEB-B40F-8B2DB02A23A7}" type="datetimeFigureOut">
               <a:rPr lang="en-GB" smtClean="0"/>
-              <a:t>17/10/2016</a:t>
+              <a:t>20/10/2016</a:t>
             </a:fld>
             <a:endParaRPr lang="en-GB"/>
           </a:p>
@@ -2098,7 +2098,7 @@
           <a:p>
             <a:fld id="{4F779DD4-469B-4BEB-B40F-8B2DB02A23A7}" type="datetimeFigureOut">
               <a:rPr lang="en-GB" smtClean="0"/>
-              <a:t>17/10/2016</a:t>
+              <a:t>20/10/2016</a:t>
             </a:fld>
             <a:endParaRPr lang="en-GB"/>
           </a:p>
@@ -2355,7 +2355,7 @@
           <a:p>
             <a:fld id="{4F779DD4-469B-4BEB-B40F-8B2DB02A23A7}" type="datetimeFigureOut">
               <a:rPr lang="en-GB" smtClean="0"/>
-              <a:t>17/10/2016</a:t>
+              <a:t>20/10/2016</a:t>
             </a:fld>
             <a:endParaRPr lang="en-GB"/>
           </a:p>
@@ -2568,7 +2568,7 @@
           <a:p>
             <a:fld id="{4F779DD4-469B-4BEB-B40F-8B2DB02A23A7}" type="datetimeFigureOut">
               <a:rPr lang="en-GB" smtClean="0"/>
-              <a:t>17/10/2016</a:t>
+              <a:t>20/10/2016</a:t>
             </a:fld>
             <a:endParaRPr lang="en-GB"/>
           </a:p>
@@ -2981,8 +2981,8 @@
         </p:nvSpPr>
         <p:spPr>
           <a:xfrm>
-            <a:off x="185549" y="2542926"/>
-            <a:ext cx="6073806" cy="728707"/>
+            <a:off x="117807" y="2542926"/>
+            <a:ext cx="7168146" cy="728707"/>
           </a:xfrm>
           <a:prstGeom prst="rect">
             <a:avLst/>
@@ -3027,8 +3027,8 @@
         </p:nvSpPr>
         <p:spPr>
           <a:xfrm>
-            <a:off x="185548" y="1737769"/>
-            <a:ext cx="2522738" cy="728707"/>
+            <a:off x="1946608" y="1737769"/>
+            <a:ext cx="2197792" cy="728707"/>
           </a:xfrm>
           <a:prstGeom prst="rect">
             <a:avLst/>
@@ -3085,8 +3085,8 @@
         </p:nvSpPr>
         <p:spPr>
           <a:xfrm>
-            <a:off x="2797063" y="1737769"/>
-            <a:ext cx="2530137" cy="728707"/>
+            <a:off x="4212974" y="1737769"/>
+            <a:ext cx="2140824" cy="728707"/>
           </a:xfrm>
           <a:prstGeom prst="rect">
             <a:avLst/>
@@ -3147,8 +3147,8 @@
         </p:nvSpPr>
         <p:spPr>
           <a:xfrm>
-            <a:off x="185549" y="932613"/>
-            <a:ext cx="1442623" cy="728707"/>
+            <a:off x="117807" y="1737767"/>
+            <a:ext cx="1760228" cy="728707"/>
           </a:xfrm>
           <a:prstGeom prst="rect">
             <a:avLst/>
@@ -3183,9 +3183,12 @@
               <a:rPr lang="en-GB" sz="1500" dirty="0" err="1"/>
               <a:t>Addons</a:t>
             </a:r>
-            <a:r>
+            <a:br>
               <a:rPr lang="en-GB" sz="1500" dirty="0"/>
-              <a:t> Wicket Components</a:t>
+            </a:br>
+            <a:r>
+              <a:rPr lang="en-GB" sz="1500" dirty="0"/>
+              <a:t>Wicket Components</a:t>
             </a:r>
           </a:p>
         </p:txBody>
@@ -3198,8 +3201,8 @@
         </p:nvSpPr>
         <p:spPr>
           <a:xfrm>
-            <a:off x="1695985" y="932613"/>
-            <a:ext cx="4560132" cy="728707"/>
+            <a:off x="117957" y="932613"/>
+            <a:ext cx="7164758" cy="728707"/>
           </a:xfrm>
           <a:prstGeom prst="rect">
             <a:avLst/>
@@ -3268,8 +3271,8 @@
         </p:nvSpPr>
         <p:spPr>
           <a:xfrm>
-            <a:off x="185549" y="127457"/>
-            <a:ext cx="6073806" cy="728707"/>
+            <a:off x="117807" y="127457"/>
+            <a:ext cx="7168146" cy="728707"/>
           </a:xfrm>
           <a:prstGeom prst="rect">
             <a:avLst/>
@@ -3322,7 +3325,7 @@
         </p:nvSpPr>
         <p:spPr>
           <a:xfrm>
-            <a:off x="5412739" y="1661319"/>
+            <a:off x="6439337" y="1661319"/>
             <a:ext cx="843379" cy="805155"/>
           </a:xfrm>
           <a:prstGeom prst="rect">
@@ -3370,7 +3373,7 @@
         </p:nvSpPr>
         <p:spPr>
           <a:xfrm>
-            <a:off x="5430617" y="1581170"/>
+            <a:off x="6457215" y="1581170"/>
             <a:ext cx="825500" cy="114559"/>
           </a:xfrm>
           <a:prstGeom prst="rect">

</xml_diff>